<commit_message>
Presentación y guión sujetos a corrección
</commit_message>
<xml_diff>
--- a/Proyecto I/Presentación/Arquitectura Objetivo MPLA.pptx
+++ b/Proyecto I/Presentación/Arquitectura Objetivo MPLA.pptx
@@ -30428,36 +30428,6 @@
       </p:sp>
       <p:pic>
         <p:nvPicPr>
-          <p:cNvPr id="8" name="Imagen 3"/>
-          <p:cNvPicPr/>
-          <p:nvPr/>
-        </p:nvPicPr>
-        <p:blipFill>
-          <a:blip r:embed="rId7" cstate="print"/>
-          <a:srcRect/>
-          <a:stretch>
-            <a:fillRect/>
-          </a:stretch>
-        </p:blipFill>
-        <p:spPr bwMode="auto">
-          <a:xfrm>
-            <a:off x="10400665" y="6181090"/>
-            <a:ext cx="1791335" cy="676910"/>
-          </a:xfrm>
-          <a:prstGeom prst="rect">
-            <a:avLst/>
-          </a:prstGeom>
-          <a:noFill/>
-          <a:ln w="9525">
-            <a:noFill/>
-            <a:miter lim="800000"/>
-            <a:headEnd/>
-            <a:tailEnd/>
-          </a:ln>
-        </p:spPr>
-      </p:pic>
-      <p:pic>
-        <p:nvPicPr>
           <p:cNvPr id="9" name="Imagen 3"/>
           <p:cNvPicPr/>
           <p:nvPr/>
@@ -31497,7 +31467,7 @@
         </p:nvSpPr>
         <p:spPr>
           <a:xfrm>
-            <a:off x="1484311" y="76204"/>
+            <a:off x="983114" y="-607266"/>
             <a:ext cx="10018713" cy="1752599"/>
           </a:xfrm>
         </p:spPr>
@@ -31537,1004 +31507,6 @@
           </a:p>
         </p:txBody>
       </p:sp>
-      <p:graphicFrame>
-        <p:nvGraphicFramePr>
-          <p:cNvPr id="3" name="2 Tabla"/>
-          <p:cNvGraphicFramePr>
-            <a:graphicFrameLocks noGrp="1"/>
-          </p:cNvGraphicFramePr>
-          <p:nvPr>
-            <p:extLst>
-              <p:ext uri="{D42A27DB-BD31-4B8C-83A1-F6EECF244321}">
-                <p14:modId xmlns:p14="http://schemas.microsoft.com/office/powerpoint/2010/main" val="3846097299"/>
-              </p:ext>
-            </p:extLst>
-          </p:nvPr>
-        </p:nvGraphicFramePr>
-        <p:xfrm>
-          <a:off x="2063262" y="2250833"/>
-          <a:ext cx="8862647" cy="3059720"/>
-        </p:xfrm>
-        <a:graphic>
-          <a:graphicData uri="http://schemas.openxmlformats.org/drawingml/2006/table">
-            <a:tbl>
-              <a:tblPr firstRow="1" firstCol="1" bandRow="1">
-                <a:tableStyleId>{5C22544A-7EE6-4342-B048-85BDC9FD1C3A}</a:tableStyleId>
-              </a:tblPr>
-              <a:tblGrid>
-                <a:gridCol w="1098968"/>
-                <a:gridCol w="5370765"/>
-                <a:gridCol w="1098968"/>
-                <a:gridCol w="1293946"/>
-              </a:tblGrid>
-              <a:tr h="292291">
-                <a:tc gridSpan="2">
-                  <a:txBody>
-                    <a:bodyPr/>
-                    <a:lstStyle/>
-                    <a:p>
-                      <a:pPr marL="0" marR="0">
-                        <a:lnSpc>
-                          <a:spcPct val="115000"/>
-                        </a:lnSpc>
-                        <a:spcBef>
-                          <a:spcPts val="0"/>
-                        </a:spcBef>
-                        <a:spcAft>
-                          <a:spcPts val="0"/>
-                        </a:spcAft>
-                      </a:pPr>
-                      <a:r>
-                        <a:rPr lang="es-MX" sz="1600" dirty="0">
-                          <a:effectLst/>
-                        </a:rPr>
-                        <a:t>Costo Estimado de Mano de Obra / Hora</a:t>
-                      </a:r>
-                      <a:endParaRPr lang="es-CO" sz="1600" dirty="0">
-                        <a:effectLst/>
-                        <a:latin typeface="Calibri"/>
-                        <a:ea typeface="Calibri"/>
-                        <a:cs typeface="Times New Roman"/>
-                      </a:endParaRPr>
-                    </a:p>
-                  </a:txBody>
-                  <a:tcPr marL="44450" marR="44450" marT="0" marB="0" anchor="ctr"/>
-                </a:tc>
-                <a:tc hMerge="1">
-                  <a:txBody>
-                    <a:bodyPr/>
-                    <a:lstStyle/>
-                    <a:p>
-                      <a:endParaRPr lang="es-CO"/>
-                    </a:p>
-                  </a:txBody>
-                  <a:tcPr/>
-                </a:tc>
-                <a:tc gridSpan="2">
-                  <a:txBody>
-                    <a:bodyPr/>
-                    <a:lstStyle/>
-                    <a:p>
-                      <a:pPr marL="0" marR="0" algn="r">
-                        <a:lnSpc>
-                          <a:spcPct val="115000"/>
-                        </a:lnSpc>
-                        <a:spcBef>
-                          <a:spcPts val="0"/>
-                        </a:spcBef>
-                        <a:spcAft>
-                          <a:spcPts val="0"/>
-                        </a:spcAft>
-                      </a:pPr>
-                      <a:r>
-                        <a:rPr lang="es-MX" sz="1600" dirty="0" smtClean="0">
-                          <a:effectLst/>
-                        </a:rPr>
-                        <a:t>300.000.00 </a:t>
-                      </a:r>
-                      <a:endParaRPr lang="es-CO" sz="1600" dirty="0">
-                        <a:effectLst/>
-                        <a:latin typeface="Calibri"/>
-                        <a:ea typeface="Calibri"/>
-                        <a:cs typeface="Times New Roman"/>
-                      </a:endParaRPr>
-                    </a:p>
-                  </a:txBody>
-                  <a:tcPr marL="44450" marR="44450" marT="0" marB="0" anchor="ctr"/>
-                </a:tc>
-                <a:tc hMerge="1">
-                  <a:txBody>
-                    <a:bodyPr/>
-                    <a:lstStyle/>
-                    <a:p>
-                      <a:endParaRPr lang="es-CO"/>
-                    </a:p>
-                  </a:txBody>
-                  <a:tcPr/>
-                </a:tc>
-              </a:tr>
-              <a:tr h="598182">
-                <a:tc gridSpan="2">
-                  <a:txBody>
-                    <a:bodyPr/>
-                    <a:lstStyle/>
-                    <a:p>
-                      <a:pPr marL="0" marR="0">
-                        <a:lnSpc>
-                          <a:spcPct val="115000"/>
-                        </a:lnSpc>
-                        <a:spcBef>
-                          <a:spcPts val="0"/>
-                        </a:spcBef>
-                        <a:spcAft>
-                          <a:spcPts val="0"/>
-                        </a:spcAft>
-                      </a:pPr>
-                      <a:r>
-                        <a:rPr lang="es-MX" sz="1600" dirty="0">
-                          <a:effectLst/>
-                        </a:rPr>
-                        <a:t>Proyecto</a:t>
-                      </a:r>
-                      <a:endParaRPr lang="es-CO" sz="1600" dirty="0">
-                        <a:effectLst/>
-                        <a:latin typeface="Calibri"/>
-                        <a:ea typeface="Calibri"/>
-                        <a:cs typeface="Times New Roman"/>
-                      </a:endParaRPr>
-                    </a:p>
-                  </a:txBody>
-                  <a:tcPr marL="44450" marR="44450" marT="0" marB="0" anchor="ctr"/>
-                </a:tc>
-                <a:tc hMerge="1">
-                  <a:txBody>
-                    <a:bodyPr/>
-                    <a:lstStyle/>
-                    <a:p>
-                      <a:endParaRPr lang="es-CO"/>
-                    </a:p>
-                  </a:txBody>
-                  <a:tcPr/>
-                </a:tc>
-                <a:tc>
-                  <a:txBody>
-                    <a:bodyPr/>
-                    <a:lstStyle/>
-                    <a:p>
-                      <a:pPr marL="0" marR="0" algn="ctr">
-                        <a:lnSpc>
-                          <a:spcPct val="115000"/>
-                        </a:lnSpc>
-                        <a:spcBef>
-                          <a:spcPts val="0"/>
-                        </a:spcBef>
-                        <a:spcAft>
-                          <a:spcPts val="0"/>
-                        </a:spcAft>
-                      </a:pPr>
-                      <a:r>
-                        <a:rPr lang="es-MX" sz="1600">
-                          <a:effectLst/>
-                        </a:rPr>
-                        <a:t>Horas Estimadas</a:t>
-                      </a:r>
-                      <a:endParaRPr lang="es-CO" sz="1600">
-                        <a:effectLst/>
-                        <a:latin typeface="Calibri"/>
-                        <a:ea typeface="Calibri"/>
-                        <a:cs typeface="Times New Roman"/>
-                      </a:endParaRPr>
-                    </a:p>
-                  </a:txBody>
-                  <a:tcPr marL="44450" marR="44450" marT="0" marB="0" anchor="ctr"/>
-                </a:tc>
-                <a:tc>
-                  <a:txBody>
-                    <a:bodyPr/>
-                    <a:lstStyle/>
-                    <a:p>
-                      <a:pPr marL="0" marR="0" algn="ctr">
-                        <a:lnSpc>
-                          <a:spcPct val="115000"/>
-                        </a:lnSpc>
-                        <a:spcBef>
-                          <a:spcPts val="0"/>
-                        </a:spcBef>
-                        <a:spcAft>
-                          <a:spcPts val="0"/>
-                        </a:spcAft>
-                      </a:pPr>
-                      <a:r>
-                        <a:rPr lang="es-MX" sz="1600" dirty="0">
-                          <a:effectLst/>
-                        </a:rPr>
-                        <a:t>Costo Estimado</a:t>
-                      </a:r>
-                      <a:endParaRPr lang="es-CO" sz="1600" dirty="0">
-                        <a:effectLst/>
-                        <a:latin typeface="Calibri"/>
-                        <a:ea typeface="Calibri"/>
-                        <a:cs typeface="Times New Roman"/>
-                      </a:endParaRPr>
-                    </a:p>
-                  </a:txBody>
-                  <a:tcPr marL="44450" marR="44450" marT="0" marB="0" anchor="ctr"/>
-                </a:tc>
-              </a:tr>
-              <a:tr h="292291">
-                <a:tc>
-                  <a:txBody>
-                    <a:bodyPr/>
-                    <a:lstStyle/>
-                    <a:p>
-                      <a:pPr marL="0" marR="0" algn="ctr">
-                        <a:lnSpc>
-                          <a:spcPct val="115000"/>
-                        </a:lnSpc>
-                        <a:spcBef>
-                          <a:spcPts val="0"/>
-                        </a:spcBef>
-                        <a:spcAft>
-                          <a:spcPts val="0"/>
-                        </a:spcAft>
-                      </a:pPr>
-                      <a:r>
-                        <a:rPr lang="es-MX" sz="1600">
-                          <a:effectLst/>
-                        </a:rPr>
-                        <a:t>PC1</a:t>
-                      </a:r>
-                      <a:endParaRPr lang="es-CO" sz="1600">
-                        <a:effectLst/>
-                        <a:latin typeface="Calibri"/>
-                        <a:ea typeface="Calibri"/>
-                        <a:cs typeface="Times New Roman"/>
-                      </a:endParaRPr>
-                    </a:p>
-                  </a:txBody>
-                  <a:tcPr marL="44450" marR="44450" marT="0" marB="0" anchor="ctr"/>
-                </a:tc>
-                <a:tc>
-                  <a:txBody>
-                    <a:bodyPr/>
-                    <a:lstStyle/>
-                    <a:p>
-                      <a:pPr marL="0" marR="0">
-                        <a:lnSpc>
-                          <a:spcPct val="115000"/>
-                        </a:lnSpc>
-                        <a:spcBef>
-                          <a:spcPts val="0"/>
-                        </a:spcBef>
-                        <a:spcAft>
-                          <a:spcPts val="0"/>
-                        </a:spcAft>
-                      </a:pPr>
-                      <a:r>
-                        <a:rPr lang="es-MX" sz="1600">
-                          <a:effectLst/>
-                        </a:rPr>
-                        <a:t>Automatización de procesos transaccionales</a:t>
-                      </a:r>
-                      <a:endParaRPr lang="es-CO" sz="1600">
-                        <a:effectLst/>
-                        <a:latin typeface="Calibri"/>
-                        <a:ea typeface="Calibri"/>
-                        <a:cs typeface="Times New Roman"/>
-                      </a:endParaRPr>
-                    </a:p>
-                  </a:txBody>
-                  <a:tcPr marL="44450" marR="44450" marT="0" marB="0" anchor="ctr"/>
-                </a:tc>
-                <a:tc>
-                  <a:txBody>
-                    <a:bodyPr/>
-                    <a:lstStyle/>
-                    <a:p>
-                      <a:pPr marL="0" marR="0" algn="ctr">
-                        <a:lnSpc>
-                          <a:spcPct val="115000"/>
-                        </a:lnSpc>
-                        <a:spcBef>
-                          <a:spcPts val="0"/>
-                        </a:spcBef>
-                        <a:spcAft>
-                          <a:spcPts val="0"/>
-                        </a:spcAft>
-                      </a:pPr>
-                      <a:r>
-                        <a:rPr lang="es-MX" sz="1600" dirty="0">
-                          <a:effectLst/>
-                          <a:latin typeface="Calibri" pitchFamily="34" charset="0"/>
-                        </a:rPr>
-                        <a:t>256</a:t>
-                      </a:r>
-                      <a:endParaRPr lang="es-CO" sz="1600" dirty="0">
-                        <a:effectLst/>
-                        <a:latin typeface="Calibri" pitchFamily="34" charset="0"/>
-                        <a:ea typeface="Calibri"/>
-                        <a:cs typeface="Times New Roman"/>
-                      </a:endParaRPr>
-                    </a:p>
-                  </a:txBody>
-                  <a:tcPr marL="44450" marR="44450" marT="0" marB="0" anchor="ctr"/>
-                </a:tc>
-                <a:tc>
-                  <a:txBody>
-                    <a:bodyPr/>
-                    <a:lstStyle/>
-                    <a:p>
-                      <a:pPr marL="0" marR="0" algn="ctr">
-                        <a:lnSpc>
-                          <a:spcPct val="115000"/>
-                        </a:lnSpc>
-                        <a:spcBef>
-                          <a:spcPts val="0"/>
-                        </a:spcBef>
-                        <a:spcAft>
-                          <a:spcPts val="0"/>
-                        </a:spcAft>
-                      </a:pPr>
-                      <a:r>
-                        <a:rPr lang="es-MX" sz="1600" dirty="0">
-                          <a:effectLst/>
-                          <a:latin typeface="Calibri" pitchFamily="34" charset="0"/>
-                        </a:rPr>
-                        <a:t>11,136,000.00</a:t>
-                      </a:r>
-                      <a:endParaRPr lang="es-CO" sz="1600" dirty="0">
-                        <a:effectLst/>
-                        <a:latin typeface="Calibri" pitchFamily="34" charset="0"/>
-                        <a:ea typeface="Calibri"/>
-                        <a:cs typeface="Times New Roman"/>
-                      </a:endParaRPr>
-                    </a:p>
-                  </a:txBody>
-                  <a:tcPr marL="44450" marR="44450" marT="0" marB="0" anchor="ctr"/>
-                </a:tc>
-              </a:tr>
-              <a:tr h="292291">
-                <a:tc>
-                  <a:txBody>
-                    <a:bodyPr/>
-                    <a:lstStyle/>
-                    <a:p>
-                      <a:pPr marL="0" marR="0" algn="ctr">
-                        <a:lnSpc>
-                          <a:spcPct val="115000"/>
-                        </a:lnSpc>
-                        <a:spcBef>
-                          <a:spcPts val="0"/>
-                        </a:spcBef>
-                        <a:spcAft>
-                          <a:spcPts val="0"/>
-                        </a:spcAft>
-                      </a:pPr>
-                      <a:r>
-                        <a:rPr lang="es-MX" sz="1600">
-                          <a:effectLst/>
-                        </a:rPr>
-                        <a:t>PC2</a:t>
-                      </a:r>
-                      <a:endParaRPr lang="es-CO" sz="1600">
-                        <a:effectLst/>
-                        <a:latin typeface="Calibri"/>
-                        <a:ea typeface="Calibri"/>
-                        <a:cs typeface="Times New Roman"/>
-                      </a:endParaRPr>
-                    </a:p>
-                  </a:txBody>
-                  <a:tcPr marL="44450" marR="44450" marT="0" marB="0" anchor="ctr"/>
-                </a:tc>
-                <a:tc>
-                  <a:txBody>
-                    <a:bodyPr/>
-                    <a:lstStyle/>
-                    <a:p>
-                      <a:pPr marL="0" marR="0">
-                        <a:lnSpc>
-                          <a:spcPct val="115000"/>
-                        </a:lnSpc>
-                        <a:spcBef>
-                          <a:spcPts val="0"/>
-                        </a:spcBef>
-                        <a:spcAft>
-                          <a:spcPts val="0"/>
-                        </a:spcAft>
-                      </a:pPr>
-                      <a:r>
-                        <a:rPr lang="es-MX" sz="1600">
-                          <a:effectLst/>
-                        </a:rPr>
-                        <a:t>Automatización de campañas</a:t>
-                      </a:r>
-                      <a:endParaRPr lang="es-CO" sz="1600">
-                        <a:effectLst/>
-                        <a:latin typeface="Calibri"/>
-                        <a:ea typeface="Calibri"/>
-                        <a:cs typeface="Times New Roman"/>
-                      </a:endParaRPr>
-                    </a:p>
-                  </a:txBody>
-                  <a:tcPr marL="44450" marR="44450" marT="0" marB="0" anchor="ctr"/>
-                </a:tc>
-                <a:tc>
-                  <a:txBody>
-                    <a:bodyPr/>
-                    <a:lstStyle/>
-                    <a:p>
-                      <a:pPr marL="0" marR="0" algn="ctr">
-                        <a:lnSpc>
-                          <a:spcPct val="115000"/>
-                        </a:lnSpc>
-                        <a:spcBef>
-                          <a:spcPts val="0"/>
-                        </a:spcBef>
-                        <a:spcAft>
-                          <a:spcPts val="0"/>
-                        </a:spcAft>
-                      </a:pPr>
-                      <a:r>
-                        <a:rPr lang="es-MX" sz="1600" dirty="0">
-                          <a:effectLst/>
-                          <a:latin typeface="Calibri" pitchFamily="34" charset="0"/>
-                        </a:rPr>
-                        <a:t>176</a:t>
-                      </a:r>
-                      <a:endParaRPr lang="es-CO" sz="1600" dirty="0">
-                        <a:effectLst/>
-                        <a:latin typeface="Calibri" pitchFamily="34" charset="0"/>
-                        <a:ea typeface="Calibri"/>
-                        <a:cs typeface="Times New Roman"/>
-                      </a:endParaRPr>
-                    </a:p>
-                  </a:txBody>
-                  <a:tcPr marL="44450" marR="44450" marT="0" marB="0" anchor="ctr"/>
-                </a:tc>
-                <a:tc>
-                  <a:txBody>
-                    <a:bodyPr/>
-                    <a:lstStyle/>
-                    <a:p>
-                      <a:pPr marL="0" marR="0" algn="ctr">
-                        <a:lnSpc>
-                          <a:spcPct val="115000"/>
-                        </a:lnSpc>
-                        <a:spcBef>
-                          <a:spcPts val="0"/>
-                        </a:spcBef>
-                        <a:spcAft>
-                          <a:spcPts val="0"/>
-                        </a:spcAft>
-                      </a:pPr>
-                      <a:r>
-                        <a:rPr lang="es-MX" sz="1600" dirty="0">
-                          <a:effectLst/>
-                          <a:latin typeface="Calibri" pitchFamily="34" charset="0"/>
-                        </a:rPr>
-                        <a:t>7,656,000.00</a:t>
-                      </a:r>
-                      <a:endParaRPr lang="es-CO" sz="1600" dirty="0">
-                        <a:effectLst/>
-                        <a:latin typeface="Calibri" pitchFamily="34" charset="0"/>
-                        <a:ea typeface="Calibri"/>
-                        <a:cs typeface="Times New Roman"/>
-                      </a:endParaRPr>
-                    </a:p>
-                  </a:txBody>
-                  <a:tcPr marL="44450" marR="44450" marT="0" marB="0" anchor="ctr"/>
-                </a:tc>
-              </a:tr>
-              <a:tr h="598182">
-                <a:tc>
-                  <a:txBody>
-                    <a:bodyPr/>
-                    <a:lstStyle/>
-                    <a:p>
-                      <a:pPr marL="0" marR="0" algn="ctr">
-                        <a:lnSpc>
-                          <a:spcPct val="115000"/>
-                        </a:lnSpc>
-                        <a:spcBef>
-                          <a:spcPts val="0"/>
-                        </a:spcBef>
-                        <a:spcAft>
-                          <a:spcPts val="0"/>
-                        </a:spcAft>
-                      </a:pPr>
-                      <a:r>
-                        <a:rPr lang="es-MX" sz="1600">
-                          <a:effectLst/>
-                        </a:rPr>
-                        <a:t>PC3</a:t>
-                      </a:r>
-                      <a:endParaRPr lang="es-CO" sz="1600">
-                        <a:effectLst/>
-                        <a:latin typeface="Calibri"/>
-                        <a:ea typeface="Calibri"/>
-                        <a:cs typeface="Times New Roman"/>
-                      </a:endParaRPr>
-                    </a:p>
-                  </a:txBody>
-                  <a:tcPr marL="44450" marR="44450" marT="0" marB="0" anchor="ctr"/>
-                </a:tc>
-                <a:tc>
-                  <a:txBody>
-                    <a:bodyPr/>
-                    <a:lstStyle/>
-                    <a:p>
-                      <a:pPr marL="0" marR="0">
-                        <a:lnSpc>
-                          <a:spcPct val="115000"/>
-                        </a:lnSpc>
-                        <a:spcBef>
-                          <a:spcPts val="0"/>
-                        </a:spcBef>
-                        <a:spcAft>
-                          <a:spcPts val="0"/>
-                        </a:spcAft>
-                      </a:pPr>
-                      <a:r>
-                        <a:rPr lang="es-MX" sz="1600" dirty="0">
-                          <a:effectLst/>
-                        </a:rPr>
-                        <a:t>Automatización proceso retroalimentación de clientes o productos</a:t>
-                      </a:r>
-                      <a:endParaRPr lang="es-CO" sz="1600" dirty="0">
-                        <a:effectLst/>
-                        <a:latin typeface="Calibri"/>
-                        <a:ea typeface="Calibri"/>
-                        <a:cs typeface="Times New Roman"/>
-                      </a:endParaRPr>
-                    </a:p>
-                  </a:txBody>
-                  <a:tcPr marL="44450" marR="44450" marT="0" marB="0" anchor="ctr"/>
-                </a:tc>
-                <a:tc>
-                  <a:txBody>
-                    <a:bodyPr/>
-                    <a:lstStyle/>
-                    <a:p>
-                      <a:pPr marL="0" marR="0" algn="ctr">
-                        <a:lnSpc>
-                          <a:spcPct val="115000"/>
-                        </a:lnSpc>
-                        <a:spcBef>
-                          <a:spcPts val="0"/>
-                        </a:spcBef>
-                        <a:spcAft>
-                          <a:spcPts val="0"/>
-                        </a:spcAft>
-                      </a:pPr>
-                      <a:r>
-                        <a:rPr lang="es-MX" sz="1600" dirty="0">
-                          <a:effectLst/>
-                          <a:latin typeface="Calibri" pitchFamily="34" charset="0"/>
-                        </a:rPr>
-                        <a:t>18</a:t>
-                      </a:r>
-                      <a:endParaRPr lang="es-CO" sz="1600" dirty="0">
-                        <a:effectLst/>
-                        <a:latin typeface="Calibri" pitchFamily="34" charset="0"/>
-                        <a:ea typeface="Calibri"/>
-                        <a:cs typeface="Times New Roman"/>
-                      </a:endParaRPr>
-                    </a:p>
-                  </a:txBody>
-                  <a:tcPr marL="44450" marR="44450" marT="0" marB="0" anchor="ctr"/>
-                </a:tc>
-                <a:tc>
-                  <a:txBody>
-                    <a:bodyPr/>
-                    <a:lstStyle/>
-                    <a:p>
-                      <a:pPr marL="0" marR="0" algn="ctr">
-                        <a:lnSpc>
-                          <a:spcPct val="115000"/>
-                        </a:lnSpc>
-                        <a:spcBef>
-                          <a:spcPts val="0"/>
-                        </a:spcBef>
-                        <a:spcAft>
-                          <a:spcPts val="0"/>
-                        </a:spcAft>
-                      </a:pPr>
-                      <a:r>
-                        <a:rPr lang="es-MX" sz="1600" dirty="0">
-                          <a:effectLst/>
-                          <a:latin typeface="Calibri" pitchFamily="34" charset="0"/>
-                        </a:rPr>
-                        <a:t>783,000.00</a:t>
-                      </a:r>
-                      <a:endParaRPr lang="es-CO" sz="1600" dirty="0">
-                        <a:effectLst/>
-                        <a:latin typeface="Calibri" pitchFamily="34" charset="0"/>
-                        <a:ea typeface="Calibri"/>
-                        <a:cs typeface="Times New Roman"/>
-                      </a:endParaRPr>
-                    </a:p>
-                  </a:txBody>
-                  <a:tcPr marL="44450" marR="44450" marT="0" marB="0" anchor="ctr"/>
-                </a:tc>
-              </a:tr>
-              <a:tr h="292291">
-                <a:tc>
-                  <a:txBody>
-                    <a:bodyPr/>
-                    <a:lstStyle/>
-                    <a:p>
-                      <a:pPr marL="0" marR="0" algn="ctr">
-                        <a:lnSpc>
-                          <a:spcPct val="115000"/>
-                        </a:lnSpc>
-                        <a:spcBef>
-                          <a:spcPts val="0"/>
-                        </a:spcBef>
-                        <a:spcAft>
-                          <a:spcPts val="0"/>
-                        </a:spcAft>
-                      </a:pPr>
-                      <a:r>
-                        <a:rPr lang="es-MX" sz="1600">
-                          <a:effectLst/>
-                        </a:rPr>
-                        <a:t>PC4</a:t>
-                      </a:r>
-                      <a:endParaRPr lang="es-CO" sz="1600">
-                        <a:effectLst/>
-                        <a:latin typeface="Calibri"/>
-                        <a:ea typeface="Calibri"/>
-                        <a:cs typeface="Times New Roman"/>
-                      </a:endParaRPr>
-                    </a:p>
-                  </a:txBody>
-                  <a:tcPr marL="44450" marR="44450" marT="0" marB="0" anchor="ctr"/>
-                </a:tc>
-                <a:tc>
-                  <a:txBody>
-                    <a:bodyPr/>
-                    <a:lstStyle/>
-                    <a:p>
-                      <a:pPr marL="0" marR="0">
-                        <a:lnSpc>
-                          <a:spcPct val="115000"/>
-                        </a:lnSpc>
-                        <a:spcBef>
-                          <a:spcPts val="0"/>
-                        </a:spcBef>
-                        <a:spcAft>
-                          <a:spcPts val="0"/>
-                        </a:spcAft>
-                      </a:pPr>
-                      <a:r>
-                        <a:rPr lang="es-MX" sz="1600" dirty="0">
-                          <a:effectLst/>
-                        </a:rPr>
-                        <a:t>Monitor de transacciones</a:t>
-                      </a:r>
-                      <a:endParaRPr lang="es-CO" sz="1600" dirty="0">
-                        <a:effectLst/>
-                        <a:latin typeface="Calibri"/>
-                        <a:ea typeface="Calibri"/>
-                        <a:cs typeface="Times New Roman"/>
-                      </a:endParaRPr>
-                    </a:p>
-                  </a:txBody>
-                  <a:tcPr marL="44450" marR="44450" marT="0" marB="0" anchor="ctr"/>
-                </a:tc>
-                <a:tc>
-                  <a:txBody>
-                    <a:bodyPr/>
-                    <a:lstStyle/>
-                    <a:p>
-                      <a:pPr marL="0" marR="0" algn="ctr">
-                        <a:lnSpc>
-                          <a:spcPct val="115000"/>
-                        </a:lnSpc>
-                        <a:spcBef>
-                          <a:spcPts val="0"/>
-                        </a:spcBef>
-                        <a:spcAft>
-                          <a:spcPts val="0"/>
-                        </a:spcAft>
-                      </a:pPr>
-                      <a:r>
-                        <a:rPr lang="es-MX" sz="1600">
-                          <a:effectLst/>
-                          <a:latin typeface="Calibri" pitchFamily="34" charset="0"/>
-                        </a:rPr>
-                        <a:t>42</a:t>
-                      </a:r>
-                      <a:endParaRPr lang="es-CO" sz="1600">
-                        <a:effectLst/>
-                        <a:latin typeface="Calibri" pitchFamily="34" charset="0"/>
-                        <a:ea typeface="Calibri"/>
-                        <a:cs typeface="Times New Roman"/>
-                      </a:endParaRPr>
-                    </a:p>
-                  </a:txBody>
-                  <a:tcPr marL="44450" marR="44450" marT="0" marB="0" anchor="ctr"/>
-                </a:tc>
-                <a:tc>
-                  <a:txBody>
-                    <a:bodyPr/>
-                    <a:lstStyle/>
-                    <a:p>
-                      <a:pPr marL="0" marR="0" algn="ctr">
-                        <a:lnSpc>
-                          <a:spcPct val="115000"/>
-                        </a:lnSpc>
-                        <a:spcBef>
-                          <a:spcPts val="0"/>
-                        </a:spcBef>
-                        <a:spcAft>
-                          <a:spcPts val="0"/>
-                        </a:spcAft>
-                      </a:pPr>
-                      <a:r>
-                        <a:rPr lang="es-MX" sz="1600" dirty="0">
-                          <a:effectLst/>
-                          <a:latin typeface="Calibri" pitchFamily="34" charset="0"/>
-                        </a:rPr>
-                        <a:t>1,827,000.00</a:t>
-                      </a:r>
-                      <a:endParaRPr lang="es-CO" sz="1600" dirty="0">
-                        <a:effectLst/>
-                        <a:latin typeface="Calibri" pitchFamily="34" charset="0"/>
-                        <a:ea typeface="Calibri"/>
-                        <a:cs typeface="Times New Roman"/>
-                      </a:endParaRPr>
-                    </a:p>
-                  </a:txBody>
-                  <a:tcPr marL="44450" marR="44450" marT="0" marB="0" anchor="ctr"/>
-                </a:tc>
-              </a:tr>
-              <a:tr h="292291">
-                <a:tc>
-                  <a:txBody>
-                    <a:bodyPr/>
-                    <a:lstStyle/>
-                    <a:p>
-                      <a:pPr marL="0" marR="0" algn="ctr">
-                        <a:lnSpc>
-                          <a:spcPct val="115000"/>
-                        </a:lnSpc>
-                        <a:spcBef>
-                          <a:spcPts val="0"/>
-                        </a:spcBef>
-                        <a:spcAft>
-                          <a:spcPts val="0"/>
-                        </a:spcAft>
-                      </a:pPr>
-                      <a:r>
-                        <a:rPr lang="es-MX" sz="1600">
-                          <a:effectLst/>
-                        </a:rPr>
-                        <a:t>PC5</a:t>
-                      </a:r>
-                      <a:endParaRPr lang="es-CO" sz="1600">
-                        <a:effectLst/>
-                        <a:latin typeface="Calibri"/>
-                        <a:ea typeface="Calibri"/>
-                        <a:cs typeface="Times New Roman"/>
-                      </a:endParaRPr>
-                    </a:p>
-                  </a:txBody>
-                  <a:tcPr marL="44450" marR="44450" marT="0" marB="0" anchor="ctr"/>
-                </a:tc>
-                <a:tc>
-                  <a:txBody>
-                    <a:bodyPr/>
-                    <a:lstStyle/>
-                    <a:p>
-                      <a:pPr marL="0" marR="0">
-                        <a:lnSpc>
-                          <a:spcPct val="115000"/>
-                        </a:lnSpc>
-                        <a:spcBef>
-                          <a:spcPts val="0"/>
-                        </a:spcBef>
-                        <a:spcAft>
-                          <a:spcPts val="0"/>
-                        </a:spcAft>
-                      </a:pPr>
-                      <a:r>
-                        <a:rPr lang="es-MX" sz="1600" dirty="0">
-                          <a:effectLst/>
-                        </a:rPr>
-                        <a:t>Evaluación de acuerdos de servicio</a:t>
-                      </a:r>
-                      <a:endParaRPr lang="es-CO" sz="1600" dirty="0">
-                        <a:effectLst/>
-                        <a:latin typeface="Calibri"/>
-                        <a:ea typeface="Calibri"/>
-                        <a:cs typeface="Times New Roman"/>
-                      </a:endParaRPr>
-                    </a:p>
-                  </a:txBody>
-                  <a:tcPr marL="44450" marR="44450" marT="0" marB="0" anchor="ctr"/>
-                </a:tc>
-                <a:tc>
-                  <a:txBody>
-                    <a:bodyPr/>
-                    <a:lstStyle/>
-                    <a:p>
-                      <a:pPr marL="0" marR="0" algn="ctr">
-                        <a:lnSpc>
-                          <a:spcPct val="115000"/>
-                        </a:lnSpc>
-                        <a:spcBef>
-                          <a:spcPts val="0"/>
-                        </a:spcBef>
-                        <a:spcAft>
-                          <a:spcPts val="0"/>
-                        </a:spcAft>
-                      </a:pPr>
-                      <a:r>
-                        <a:rPr lang="es-MX" sz="1600" dirty="0">
-                          <a:effectLst/>
-                          <a:latin typeface="Calibri" pitchFamily="34" charset="0"/>
-                        </a:rPr>
-                        <a:t>60</a:t>
-                      </a:r>
-                      <a:endParaRPr lang="es-CO" sz="1600" dirty="0">
-                        <a:effectLst/>
-                        <a:latin typeface="Calibri" pitchFamily="34" charset="0"/>
-                        <a:ea typeface="Calibri"/>
-                        <a:cs typeface="Times New Roman"/>
-                      </a:endParaRPr>
-                    </a:p>
-                  </a:txBody>
-                  <a:tcPr marL="44450" marR="44450" marT="0" marB="0" anchor="ctr"/>
-                </a:tc>
-                <a:tc>
-                  <a:txBody>
-                    <a:bodyPr/>
-                    <a:lstStyle/>
-                    <a:p>
-                      <a:pPr marL="0" marR="0" algn="ctr">
-                        <a:lnSpc>
-                          <a:spcPct val="115000"/>
-                        </a:lnSpc>
-                        <a:spcBef>
-                          <a:spcPts val="0"/>
-                        </a:spcBef>
-                        <a:spcAft>
-                          <a:spcPts val="0"/>
-                        </a:spcAft>
-                      </a:pPr>
-                      <a:r>
-                        <a:rPr lang="es-MX" sz="1600" dirty="0">
-                          <a:effectLst/>
-                          <a:latin typeface="Calibri" pitchFamily="34" charset="0"/>
-                        </a:rPr>
-                        <a:t>2,610,000.00</a:t>
-                      </a:r>
-                      <a:endParaRPr lang="es-CO" sz="1600" dirty="0">
-                        <a:effectLst/>
-                        <a:latin typeface="Calibri" pitchFamily="34" charset="0"/>
-                        <a:ea typeface="Calibri"/>
-                        <a:cs typeface="Times New Roman"/>
-                      </a:endParaRPr>
-                    </a:p>
-                  </a:txBody>
-                  <a:tcPr marL="44450" marR="44450" marT="0" marB="0" anchor="ctr"/>
-                </a:tc>
-              </a:tr>
-              <a:tr h="401901">
-                <a:tc gridSpan="2">
-                  <a:txBody>
-                    <a:bodyPr/>
-                    <a:lstStyle/>
-                    <a:p>
-                      <a:pPr marL="0" marR="0">
-                        <a:lnSpc>
-                          <a:spcPct val="115000"/>
-                        </a:lnSpc>
-                        <a:spcBef>
-                          <a:spcPts val="0"/>
-                        </a:spcBef>
-                        <a:spcAft>
-                          <a:spcPts val="0"/>
-                        </a:spcAft>
-                      </a:pPr>
-                      <a:r>
-                        <a:rPr lang="es-MX" sz="1600">
-                          <a:effectLst/>
-                        </a:rPr>
-                        <a:t>Total Solución</a:t>
-                      </a:r>
-                      <a:endParaRPr lang="es-CO" sz="1600">
-                        <a:effectLst/>
-                        <a:latin typeface="Calibri"/>
-                        <a:ea typeface="Calibri"/>
-                        <a:cs typeface="Times New Roman"/>
-                      </a:endParaRPr>
-                    </a:p>
-                  </a:txBody>
-                  <a:tcPr marL="44450" marR="44450" marT="0" marB="0" anchor="ctr"/>
-                </a:tc>
-                <a:tc hMerge="1">
-                  <a:txBody>
-                    <a:bodyPr/>
-                    <a:lstStyle/>
-                    <a:p>
-                      <a:endParaRPr lang="es-CO"/>
-                    </a:p>
-                  </a:txBody>
-                  <a:tcPr/>
-                </a:tc>
-                <a:tc>
-                  <a:txBody>
-                    <a:bodyPr/>
-                    <a:lstStyle/>
-                    <a:p>
-                      <a:pPr marL="0" marR="0" algn="ctr">
-                        <a:lnSpc>
-                          <a:spcPct val="115000"/>
-                        </a:lnSpc>
-                        <a:spcBef>
-                          <a:spcPts val="0"/>
-                        </a:spcBef>
-                        <a:spcAft>
-                          <a:spcPts val="0"/>
-                        </a:spcAft>
-                      </a:pPr>
-                      <a:r>
-                        <a:rPr lang="es-MX" sz="1600" dirty="0">
-                          <a:effectLst/>
-                          <a:latin typeface="Calibri" pitchFamily="34" charset="0"/>
-                        </a:rPr>
-                        <a:t>552</a:t>
-                      </a:r>
-                      <a:endParaRPr lang="es-CO" sz="1600" dirty="0">
-                        <a:effectLst/>
-                        <a:latin typeface="Calibri" pitchFamily="34" charset="0"/>
-                        <a:ea typeface="Calibri"/>
-                        <a:cs typeface="Times New Roman"/>
-                      </a:endParaRPr>
-                    </a:p>
-                  </a:txBody>
-                  <a:tcPr marL="44450" marR="44450" marT="0" marB="0" anchor="ctr"/>
-                </a:tc>
-                <a:tc>
-                  <a:txBody>
-                    <a:bodyPr/>
-                    <a:lstStyle/>
-                    <a:p>
-                      <a:pPr marL="0" marR="0" algn="ctr">
-                        <a:lnSpc>
-                          <a:spcPct val="115000"/>
-                        </a:lnSpc>
-                        <a:spcBef>
-                          <a:spcPts val="0"/>
-                        </a:spcBef>
-                        <a:spcAft>
-                          <a:spcPts val="0"/>
-                        </a:spcAft>
-                      </a:pPr>
-                      <a:r>
-                        <a:rPr lang="es-MX" sz="1600" dirty="0">
-                          <a:effectLst/>
-                          <a:latin typeface="Calibri" pitchFamily="34" charset="0"/>
-                        </a:rPr>
-                        <a:t>24,012,000.00</a:t>
-                      </a:r>
-                      <a:endParaRPr lang="es-CO" sz="1600" dirty="0">
-                        <a:effectLst/>
-                        <a:latin typeface="Calibri" pitchFamily="34" charset="0"/>
-                        <a:ea typeface="Calibri"/>
-                        <a:cs typeface="Times New Roman"/>
-                      </a:endParaRPr>
-                    </a:p>
-                  </a:txBody>
-                  <a:tcPr marL="44450" marR="44450" marT="0" marB="0" anchor="ctr"/>
-                </a:tc>
-              </a:tr>
-            </a:tbl>
-          </a:graphicData>
-        </a:graphic>
-      </p:graphicFrame>
       <p:pic>
         <p:nvPicPr>
           <p:cNvPr id="6" name="Imagen 3"/>
@@ -32597,6 +31569,45 @@
           <a:xfrm>
             <a:off x="10043885" y="269034"/>
             <a:ext cx="1915886" cy="1266888"/>
+          </a:xfrm>
+          <a:prstGeom prst="rect">
+            <a:avLst/>
+          </a:prstGeom>
+        </p:spPr>
+      </p:pic>
+      <p:pic>
+        <p:nvPicPr>
+          <p:cNvPr id="8" name="7 Imagen"/>
+          <p:cNvPicPr>
+            <a:picLocks noChangeAspect="1"/>
+          </p:cNvPicPr>
+          <p:nvPr/>
+        </p:nvPicPr>
+        <p:blipFill>
+          <a:blip r:embed="rId5">
+            <a:extLst>
+              <a:ext uri="{BEBA8EAE-BF5A-486C-A8C5-ECC9F3942E4B}">
+                <a14:imgProps xmlns:a14="http://schemas.microsoft.com/office/drawing/2010/main">
+                  <a14:imgLayer r:embed="rId6">
+                    <a14:imgEffect>
+                      <a14:saturation sat="400000"/>
+                    </a14:imgEffect>
+                  </a14:imgLayer>
+                </a14:imgProps>
+              </a:ext>
+              <a:ext uri="{28A0092B-C50C-407E-A947-70E740481C1C}">
+                <a14:useLocalDpi xmlns:a14="http://schemas.microsoft.com/office/drawing/2010/main" val="0"/>
+              </a:ext>
+            </a:extLst>
+          </a:blip>
+          <a:stretch>
+            <a:fillRect/>
+          </a:stretch>
+        </p:blipFill>
+        <p:spPr>
+          <a:xfrm>
+            <a:off x="1271902" y="1304937"/>
+            <a:ext cx="8194070" cy="5115639"/>
           </a:xfrm>
           <a:prstGeom prst="rect">
             <a:avLst/>
@@ -33481,6 +32492,173 @@
           </a:prstGeom>
         </p:spPr>
       </p:pic>
+      <p:sp>
+        <p:nvSpPr>
+          <p:cNvPr id="3" name="2 Rectángulo"/>
+          <p:cNvSpPr/>
+          <p:nvPr/>
+        </p:nvSpPr>
+        <p:spPr>
+          <a:xfrm>
+            <a:off x="9498704" y="1853415"/>
+            <a:ext cx="1308371" cy="369332"/>
+          </a:xfrm>
+          <a:prstGeom prst="rect">
+            <a:avLst/>
+          </a:prstGeom>
+        </p:spPr>
+        <p:txBody>
+          <a:bodyPr wrap="none">
+            <a:spAutoFit/>
+            <a:scene3d>
+              <a:camera prst="orthographicFront"/>
+              <a:lightRig rig="brightRoom" dir="t"/>
+            </a:scene3d>
+            <a:sp3d contourW="6350" prstMaterial="plastic">
+              <a:bevelT w="20320" h="20320" prst="angle"/>
+              <a:contourClr>
+                <a:schemeClr val="accent1">
+                  <a:tint val="100000"/>
+                  <a:shade val="100000"/>
+                  <a:hueMod val="100000"/>
+                  <a:satMod val="100000"/>
+                </a:schemeClr>
+              </a:contourClr>
+            </a:sp3d>
+          </a:bodyPr>
+          <a:lstStyle/>
+          <a:p>
+            <a:r>
+              <a:rPr lang="es-MX" b="1" cap="all" dirty="0">
+                <a:ln/>
+                <a:solidFill>
+                  <a:schemeClr val="accent1"/>
+                </a:solidFill>
+                <a:effectLst>
+                  <a:outerShdw blurRad="19685" dist="12700" dir="5400000" algn="tl" rotWithShape="0">
+                    <a:schemeClr val="accent1">
+                      <a:satMod val="130000"/>
+                      <a:alpha val="60000"/>
+                    </a:schemeClr>
+                  </a:outerShdw>
+                  <a:reflection blurRad="10000" stA="55000" endPos="48000" dist="500" dir="5400000" sy="-100000" algn="bl" rotWithShape="0"/>
+                </a:effectLst>
+                <a:latin typeface="Calibri" pitchFamily="34" charset="0"/>
+              </a:rPr>
+              <a:t>474 </a:t>
+            </a:r>
+            <a:r>
+              <a:rPr lang="es-MX" b="1" cap="all" dirty="0" smtClean="0">
+                <a:ln/>
+                <a:solidFill>
+                  <a:schemeClr val="accent1"/>
+                </a:solidFill>
+                <a:effectLst>
+                  <a:outerShdw blurRad="19685" dist="12700" dir="5400000" algn="tl" rotWithShape="0">
+                    <a:schemeClr val="accent1">
+                      <a:satMod val="130000"/>
+                      <a:alpha val="60000"/>
+                    </a:schemeClr>
+                  </a:outerShdw>
+                  <a:reflection blurRad="10000" stA="55000" endPos="48000" dist="500" dir="5400000" sy="-100000" algn="bl" rotWithShape="0"/>
+                </a:effectLst>
+                <a:latin typeface="Calibri" pitchFamily="34" charset="0"/>
+              </a:rPr>
+              <a:t>horas</a:t>
+            </a:r>
+            <a:endParaRPr lang="es-CO" b="1" cap="all" dirty="0">
+              <a:ln/>
+              <a:solidFill>
+                <a:schemeClr val="accent1"/>
+              </a:solidFill>
+              <a:effectLst>
+                <a:outerShdw blurRad="19685" dist="12700" dir="5400000" algn="tl" rotWithShape="0">
+                  <a:schemeClr val="accent1">
+                    <a:satMod val="130000"/>
+                    <a:alpha val="60000"/>
+                  </a:schemeClr>
+                </a:outerShdw>
+                <a:reflection blurRad="10000" stA="55000" endPos="48000" dist="500" dir="5400000" sy="-100000" algn="bl" rotWithShape="0"/>
+              </a:effectLst>
+              <a:latin typeface="Calibri" pitchFamily="34" charset="0"/>
+            </a:endParaRPr>
+          </a:p>
+        </p:txBody>
+      </p:sp>
+      <p:sp>
+        <p:nvSpPr>
+          <p:cNvPr id="10" name="9 Rectángulo"/>
+          <p:cNvSpPr/>
+          <p:nvPr/>
+        </p:nvSpPr>
+        <p:spPr>
+          <a:xfrm>
+            <a:off x="9389699" y="4158734"/>
+            <a:ext cx="1824538" cy="369332"/>
+          </a:xfrm>
+          <a:prstGeom prst="rect">
+            <a:avLst/>
+          </a:prstGeom>
+        </p:spPr>
+        <p:txBody>
+          <a:bodyPr wrap="none">
+            <a:spAutoFit/>
+            <a:scene3d>
+              <a:camera prst="orthographicFront"/>
+              <a:lightRig rig="brightRoom" dir="t"/>
+            </a:scene3d>
+            <a:sp3d contourW="6350" prstMaterial="plastic">
+              <a:bevelT w="20320" h="20320" prst="angle"/>
+              <a:contourClr>
+                <a:schemeClr val="accent1">
+                  <a:tint val="100000"/>
+                  <a:shade val="100000"/>
+                  <a:hueMod val="100000"/>
+                  <a:satMod val="100000"/>
+                </a:schemeClr>
+              </a:contourClr>
+            </a:sp3d>
+          </a:bodyPr>
+          <a:lstStyle/>
+          <a:p>
+            <a:r>
+              <a:rPr lang="es-MX" b="1" cap="all" dirty="0" smtClean="0">
+                <a:ln/>
+                <a:solidFill>
+                  <a:schemeClr val="accent1"/>
+                </a:solidFill>
+                <a:effectLst>
+                  <a:outerShdw blurRad="19685" dist="12700" dir="5400000" algn="tl" rotWithShape="0">
+                    <a:schemeClr val="accent1">
+                      <a:satMod val="130000"/>
+                      <a:alpha val="60000"/>
+                    </a:schemeClr>
+                  </a:outerShdw>
+                  <a:reflection blurRad="10000" stA="55000" endPos="48000" dist="500" dir="5400000" sy="-100000" algn="bl" rotWithShape="0"/>
+                </a:effectLst>
+                <a:latin typeface="Calibri" pitchFamily="34" charset="0"/>
+              </a:rPr>
+              <a:t>$ 142.200.000.00</a:t>
+            </a:r>
+            <a:endParaRPr lang="es-CO" b="1" cap="all" dirty="0">
+              <a:ln/>
+              <a:solidFill>
+                <a:schemeClr val="accent1"/>
+              </a:solidFill>
+              <a:effectLst>
+                <a:outerShdw blurRad="19685" dist="12700" dir="5400000" algn="tl" rotWithShape="0">
+                  <a:schemeClr val="accent1">
+                    <a:satMod val="130000"/>
+                    <a:alpha val="60000"/>
+                  </a:schemeClr>
+                </a:outerShdw>
+                <a:reflection blurRad="10000" stA="55000" endPos="48000" dist="500" dir="5400000" sy="-100000" algn="bl" rotWithShape="0"/>
+              </a:effectLst>
+              <a:latin typeface="Calibri" pitchFamily="34" charset="0"/>
+            </a:endParaRPr>
+          </a:p>
+        </p:txBody>
+      </p:sp>
     </p:spTree>
     <p:extLst>
       <p:ext uri="{BB962C8B-B14F-4D97-AF65-F5344CB8AC3E}">
@@ -35954,87 +35132,60 @@
         </p:nvSpPr>
         <p:spPr>
           <a:xfrm>
-            <a:off x="1472587" y="2244968"/>
-            <a:ext cx="10018713" cy="3124201"/>
+            <a:off x="1516130" y="2811026"/>
+            <a:ext cx="10018713" cy="1920632"/>
           </a:xfrm>
         </p:spPr>
         <p:txBody>
           <a:bodyPr>
-            <a:normAutofit fontScale="92500"/>
+            <a:normAutofit/>
           </a:bodyPr>
           <a:lstStyle/>
           <a:p>
             <a:r>
-              <a:rPr lang="es-MX" dirty="0" smtClean="0"/>
+              <a:rPr lang="es-MX" dirty="0" smtClean="0">
+                <a:latin typeface="Calibri" pitchFamily="34" charset="0"/>
+              </a:rPr>
               <a:t>Motivador principal: Enfocar </a:t>
             </a:r>
             <a:r>
-              <a:rPr lang="es-MX" dirty="0"/>
+              <a:rPr lang="es-MX" dirty="0">
+                <a:latin typeface="Calibri" pitchFamily="34" charset="0"/>
+              </a:rPr>
               <a:t>la operación de la empresa hacia las necesidades de los clientes</a:t>
             </a:r>
             <a:r>
-              <a:rPr lang="es-MX" dirty="0" smtClean="0"/>
+              <a:rPr lang="es-MX" dirty="0" smtClean="0">
+                <a:latin typeface="Calibri" pitchFamily="34" charset="0"/>
+              </a:rPr>
               <a:t>.</a:t>
             </a:r>
           </a:p>
           <a:p>
             <a:r>
-              <a:rPr lang="es-MX" dirty="0" smtClean="0"/>
+              <a:rPr lang="es-MX" dirty="0" smtClean="0">
+                <a:latin typeface="Calibri" pitchFamily="34" charset="0"/>
+              </a:rPr>
               <a:t>Plan estratégico MPLA 2013: Proveer </a:t>
             </a:r>
             <a:r>
-              <a:rPr lang="es-MX" dirty="0"/>
+              <a:rPr lang="es-MX" dirty="0">
+                <a:latin typeface="Calibri" pitchFamily="34" charset="0"/>
+              </a:rPr>
               <a:t>a los clientes de </a:t>
             </a:r>
             <a:r>
-              <a:rPr lang="es-MX" dirty="0" smtClean="0"/>
+              <a:rPr lang="es-MX" dirty="0" smtClean="0">
+                <a:latin typeface="Calibri" pitchFamily="34" charset="0"/>
+              </a:rPr>
               <a:t>nuevas funcionalidades </a:t>
             </a:r>
             <a:r>
-              <a:rPr lang="es-MX" dirty="0"/>
-              <a:t>que satisfagan sus necesidades e inciten a utilizar más la plataforma </a:t>
+              <a:rPr lang="es-MX" dirty="0" smtClean="0">
+                <a:latin typeface="Calibri" pitchFamily="34" charset="0"/>
+              </a:rPr>
+              <a:t>.</a:t>
             </a:r>
-            <a:r>
-              <a:rPr lang="es-MX" dirty="0" smtClean="0"/>
-              <a:t>que </a:t>
-            </a:r>
-            <a:r>
-              <a:rPr lang="es-MX" dirty="0"/>
-              <a:t>se les </a:t>
-            </a:r>
-            <a:r>
-              <a:rPr lang="es-MX" dirty="0" smtClean="0"/>
-              <a:t>ofrece</a:t>
-            </a:r>
-          </a:p>
-          <a:p>
-            <a:r>
-              <a:rPr lang="es-MX" dirty="0" smtClean="0"/>
-              <a:t>Características de la nuevas funcionalidades:</a:t>
-            </a:r>
-          </a:p>
-          <a:p>
-            <a:pPr lvl="1"/>
-            <a:r>
-              <a:rPr lang="es-MX" dirty="0" smtClean="0"/>
-              <a:t>Brindar </a:t>
-            </a:r>
-            <a:r>
-              <a:rPr lang="es-MX" dirty="0"/>
-              <a:t>nuevos </a:t>
-            </a:r>
-            <a:r>
-              <a:rPr lang="es-MX" dirty="0" smtClean="0"/>
-              <a:t>medios transaccionales a sus clientes</a:t>
-            </a:r>
-          </a:p>
-          <a:p>
-            <a:pPr lvl="1"/>
-            <a:r>
-              <a:rPr lang="es-MX" dirty="0" smtClean="0"/>
-              <a:t>Ofrecer a los clientes mayor control sobre las transacciones </a:t>
-            </a:r>
-            <a:endParaRPr lang="es-MX" dirty="0"/>
           </a:p>
         </p:txBody>
       </p:sp>

</xml_diff>